<commit_message>
update sdt and top-down parsing notes
</commit_message>
<xml_diff>
--- a/assets/ppt/parsing/lr5-prec-assoc.pptx
+++ b/assets/ppt/parsing/lr5-prec-assoc.pptx
@@ -5,10 +5,10 @@
     <p:sldMasterId id="2147483660" r:id="rId1"/>
   </p:sldMasterIdLst>
   <p:notesMasterIdLst>
-    <p:notesMasterId r:id="rId15"/>
+    <p:notesMasterId r:id="rId11"/>
   </p:notesMasterIdLst>
   <p:handoutMasterIdLst>
-    <p:handoutMasterId r:id="rId16"/>
+    <p:handoutMasterId r:id="rId12"/>
   </p:handoutMasterIdLst>
   <p:sldIdLst>
     <p:sldId id="437" r:id="rId2"/>
@@ -19,11 +19,7 @@
     <p:sldId id="406" r:id="rId7"/>
     <p:sldId id="407" r:id="rId8"/>
     <p:sldId id="412" r:id="rId9"/>
-    <p:sldId id="377" r:id="rId10"/>
-    <p:sldId id="378" r:id="rId11"/>
-    <p:sldId id="416" r:id="rId12"/>
-    <p:sldId id="417" r:id="rId13"/>
-    <p:sldId id="401" r:id="rId14"/>
+    <p:sldId id="401" r:id="rId10"/>
   </p:sldIdLst>
   <p:sldSz cx="9144000" cy="6858000" type="screen4x3"/>
   <p:notesSz cx="6858000" cy="9144000"/>
@@ -253,7 +249,7 @@
           <a:p>
             <a:fld id="{8FB9796E-8218-104C-80DE-FD5737E53010}" type="datetimeFigureOut">
               <a:rPr lang="en-US" smtClean="0"/>
-              <a:t>6/13/19</a:t>
+              <a:t>7/4/19</a:t>
             </a:fld>
             <a:endParaRPr lang="en-US"/>
           </a:p>
@@ -875,382 +871,6 @@
 </p:notes>
 </file>
 
-<file path=ppt/notesSlides/notesSlide10.xml><?xml version="1.0" encoding="utf-8"?>
-<p:notes xmlns:a="http://schemas.openxmlformats.org/drawingml/2006/main" xmlns:r="http://schemas.openxmlformats.org/officeDocument/2006/relationships" xmlns:p="http://schemas.openxmlformats.org/presentationml/2006/main">
-  <p:cSld>
-    <p:spTree>
-      <p:nvGrpSpPr>
-        <p:cNvPr id="1" name=""/>
-        <p:cNvGrpSpPr/>
-        <p:nvPr/>
-      </p:nvGrpSpPr>
-      <p:grpSpPr>
-        <a:xfrm>
-          <a:off x="0" y="0"/>
-          <a:ext cx="0" cy="0"/>
-          <a:chOff x="0" y="0"/>
-          <a:chExt cx="0" cy="0"/>
-        </a:xfrm>
-      </p:grpSpPr>
-      <p:sp>
-        <p:nvSpPr>
-          <p:cNvPr id="7" name="Rectangle 7"/>
-          <p:cNvSpPr>
-            <a:spLocks noGrp="1" noChangeArrowheads="1"/>
-          </p:cNvSpPr>
-          <p:nvPr>
-            <p:ph type="sldNum" sz="quarter" idx="5"/>
-          </p:nvPr>
-        </p:nvSpPr>
-        <p:spPr>
-          <a:ln/>
-        </p:spPr>
-        <p:txBody>
-          <a:bodyPr/>
-          <a:lstStyle/>
-          <a:p>
-            <a:fld id="{AE7B044C-EC5C-0642-BA80-FD4C2A8C6091}" type="slidenum">
-              <a:rPr lang="en-US"/>
-              <a:pPr/>
-              <a:t>10</a:t>
-            </a:fld>
-            <a:endParaRPr lang="en-US"/>
-          </a:p>
-        </p:txBody>
-      </p:sp>
-      <p:sp>
-        <p:nvSpPr>
-          <p:cNvPr id="300034" name="Rectangle 2"/>
-          <p:cNvSpPr>
-            <a:spLocks noGrp="1" noRot="1" noChangeAspect="1" noChangeArrowheads="1" noTextEdit="1"/>
-          </p:cNvSpPr>
-          <p:nvPr>
-            <p:ph type="sldImg"/>
-          </p:nvPr>
-        </p:nvSpPr>
-        <p:spPr>
-          <a:ln/>
-        </p:spPr>
-      </p:sp>
-      <p:sp>
-        <p:nvSpPr>
-          <p:cNvPr id="300035" name="Rectangle 3"/>
-          <p:cNvSpPr>
-            <a:spLocks noGrp="1" noChangeArrowheads="1"/>
-          </p:cNvSpPr>
-          <p:nvPr>
-            <p:ph type="body" idx="1"/>
-          </p:nvPr>
-        </p:nvSpPr>
-        <p:spPr/>
-        <p:txBody>
-          <a:bodyPr/>
-          <a:lstStyle/>
-          <a:p>
-            <a:endParaRPr lang="en-US"/>
-          </a:p>
-        </p:txBody>
-      </p:sp>
-    </p:spTree>
-  </p:cSld>
-  <p:clrMapOvr>
-    <a:masterClrMapping/>
-  </p:clrMapOvr>
-</p:notes>
-</file>
-
-<file path=ppt/notesSlides/notesSlide11.xml><?xml version="1.0" encoding="utf-8"?>
-<p:notes xmlns:a="http://schemas.openxmlformats.org/drawingml/2006/main" xmlns:r="http://schemas.openxmlformats.org/officeDocument/2006/relationships" xmlns:p="http://schemas.openxmlformats.org/presentationml/2006/main">
-  <p:cSld>
-    <p:spTree>
-      <p:nvGrpSpPr>
-        <p:cNvPr id="1" name=""/>
-        <p:cNvGrpSpPr/>
-        <p:nvPr/>
-      </p:nvGrpSpPr>
-      <p:grpSpPr>
-        <a:xfrm>
-          <a:off x="0" y="0"/>
-          <a:ext cx="0" cy="0"/>
-          <a:chOff x="0" y="0"/>
-          <a:chExt cx="0" cy="0"/>
-        </a:xfrm>
-      </p:grpSpPr>
-      <p:sp>
-        <p:nvSpPr>
-          <p:cNvPr id="7" name="Rectangle 7"/>
-          <p:cNvSpPr>
-            <a:spLocks noGrp="1" noChangeArrowheads="1"/>
-          </p:cNvSpPr>
-          <p:nvPr>
-            <p:ph type="sldNum" sz="quarter" idx="5"/>
-          </p:nvPr>
-        </p:nvSpPr>
-        <p:spPr>
-          <a:ln/>
-        </p:spPr>
-        <p:txBody>
-          <a:bodyPr/>
-          <a:lstStyle/>
-          <a:p>
-            <a:fld id="{B943D961-3BCF-654B-A1F2-FA1B824D3104}" type="slidenum">
-              <a:rPr lang="en-US"/>
-              <a:pPr/>
-              <a:t>11</a:t>
-            </a:fld>
-            <a:endParaRPr lang="en-US"/>
-          </a:p>
-        </p:txBody>
-      </p:sp>
-      <p:sp>
-        <p:nvSpPr>
-          <p:cNvPr id="360450" name="Rectangle 2"/>
-          <p:cNvSpPr>
-            <a:spLocks noGrp="1" noRot="1" noChangeAspect="1" noChangeArrowheads="1" noTextEdit="1"/>
-          </p:cNvSpPr>
-          <p:nvPr>
-            <p:ph type="sldImg"/>
-          </p:nvPr>
-        </p:nvSpPr>
-        <p:spPr>
-          <a:ln/>
-        </p:spPr>
-      </p:sp>
-      <p:sp>
-        <p:nvSpPr>
-          <p:cNvPr id="360451" name="Rectangle 3"/>
-          <p:cNvSpPr>
-            <a:spLocks noGrp="1" noChangeArrowheads="1"/>
-          </p:cNvSpPr>
-          <p:nvPr>
-            <p:ph type="body" idx="1"/>
-          </p:nvPr>
-        </p:nvSpPr>
-        <p:spPr/>
-        <p:txBody>
-          <a:bodyPr/>
-          <a:lstStyle/>
-          <a:p>
-            <a:endParaRPr lang="en-US"/>
-          </a:p>
-        </p:txBody>
-      </p:sp>
-    </p:spTree>
-  </p:cSld>
-  <p:clrMapOvr>
-    <a:masterClrMapping/>
-  </p:clrMapOvr>
-</p:notes>
-</file>
-
-<file path=ppt/notesSlides/notesSlide12.xml><?xml version="1.0" encoding="utf-8"?>
-<p:notes xmlns:a="http://schemas.openxmlformats.org/drawingml/2006/main" xmlns:r="http://schemas.openxmlformats.org/officeDocument/2006/relationships" xmlns:p="http://schemas.openxmlformats.org/presentationml/2006/main">
-  <p:cSld>
-    <p:spTree>
-      <p:nvGrpSpPr>
-        <p:cNvPr id="1" name=""/>
-        <p:cNvGrpSpPr/>
-        <p:nvPr/>
-      </p:nvGrpSpPr>
-      <p:grpSpPr>
-        <a:xfrm>
-          <a:off x="0" y="0"/>
-          <a:ext cx="0" cy="0"/>
-          <a:chOff x="0" y="0"/>
-          <a:chExt cx="0" cy="0"/>
-        </a:xfrm>
-      </p:grpSpPr>
-      <p:sp>
-        <p:nvSpPr>
-          <p:cNvPr id="7" name="Rectangle 7"/>
-          <p:cNvSpPr>
-            <a:spLocks noGrp="1" noChangeArrowheads="1"/>
-          </p:cNvSpPr>
-          <p:nvPr>
-            <p:ph type="sldNum" sz="quarter" idx="5"/>
-          </p:nvPr>
-        </p:nvSpPr>
-        <p:spPr>
-          <a:ln/>
-        </p:spPr>
-        <p:txBody>
-          <a:bodyPr/>
-          <a:lstStyle/>
-          <a:p>
-            <a:fld id="{5BFE98B1-76D3-E745-9880-475333C76E2E}" type="slidenum">
-              <a:rPr lang="en-US"/>
-              <a:pPr/>
-              <a:t>12</a:t>
-            </a:fld>
-            <a:endParaRPr lang="en-US"/>
-          </a:p>
-        </p:txBody>
-      </p:sp>
-      <p:sp>
-        <p:nvSpPr>
-          <p:cNvPr id="361474" name="Rectangle 2"/>
-          <p:cNvSpPr>
-            <a:spLocks noGrp="1" noRot="1" noChangeAspect="1" noChangeArrowheads="1" noTextEdit="1"/>
-          </p:cNvSpPr>
-          <p:nvPr>
-            <p:ph type="sldImg"/>
-          </p:nvPr>
-        </p:nvSpPr>
-        <p:spPr>
-          <a:ln/>
-        </p:spPr>
-      </p:sp>
-      <p:sp>
-        <p:nvSpPr>
-          <p:cNvPr id="361475" name="Rectangle 3"/>
-          <p:cNvSpPr>
-            <a:spLocks noGrp="1" noChangeArrowheads="1"/>
-          </p:cNvSpPr>
-          <p:nvPr>
-            <p:ph type="body" idx="1"/>
-          </p:nvPr>
-        </p:nvSpPr>
-        <p:spPr/>
-        <p:txBody>
-          <a:bodyPr/>
-          <a:lstStyle/>
-          <a:p>
-            <a:endParaRPr lang="en-US"/>
-          </a:p>
-        </p:txBody>
-      </p:sp>
-    </p:spTree>
-  </p:cSld>
-  <p:clrMapOvr>
-    <a:masterClrMapping/>
-  </p:clrMapOvr>
-</p:notes>
-</file>
-
-<file path=ppt/notesSlides/notesSlide13.xml><?xml version="1.0" encoding="utf-8"?>
-<p:notes xmlns:a="http://schemas.openxmlformats.org/drawingml/2006/main" xmlns:r="http://schemas.openxmlformats.org/officeDocument/2006/relationships" xmlns:p="http://schemas.openxmlformats.org/presentationml/2006/main">
-  <p:cSld>
-    <p:spTree>
-      <p:nvGrpSpPr>
-        <p:cNvPr id="1" name=""/>
-        <p:cNvGrpSpPr/>
-        <p:nvPr/>
-      </p:nvGrpSpPr>
-      <p:grpSpPr>
-        <a:xfrm>
-          <a:off x="0" y="0"/>
-          <a:ext cx="0" cy="0"/>
-          <a:chOff x="0" y="0"/>
-          <a:chExt cx="0" cy="0"/>
-        </a:xfrm>
-      </p:grpSpPr>
-      <p:sp>
-        <p:nvSpPr>
-          <p:cNvPr id="7" name="Rectangle 7"/>
-          <p:cNvSpPr>
-            <a:spLocks noGrp="1" noChangeArrowheads="1"/>
-          </p:cNvSpPr>
-          <p:nvPr>
-            <p:ph type="sldNum" sz="quarter" idx="5"/>
-          </p:nvPr>
-        </p:nvSpPr>
-        <p:spPr>
-          <a:ln/>
-        </p:spPr>
-        <p:txBody>
-          <a:bodyPr/>
-          <a:lstStyle/>
-          <a:p>
-            <a:fld id="{547073D5-5905-E744-A8B1-34206A4D9A0E}" type="slidenum">
-              <a:rPr lang="en-US"/>
-              <a:pPr/>
-              <a:t>13</a:t>
-            </a:fld>
-            <a:endParaRPr lang="en-US"/>
-          </a:p>
-        </p:txBody>
-      </p:sp>
-      <p:sp>
-        <p:nvSpPr>
-          <p:cNvPr id="322562" name="Rectangle 2"/>
-          <p:cNvSpPr>
-            <a:spLocks noGrp="1" noRot="1" noChangeAspect="1" noChangeArrowheads="1"/>
-          </p:cNvSpPr>
-          <p:nvPr>
-            <p:ph type="sldImg"/>
-          </p:nvPr>
-        </p:nvSpPr>
-        <p:spPr bwMode="auto">
-          <a:xfrm>
-            <a:off x="1143000" y="685800"/>
-            <a:ext cx="4572000" cy="3429000"/>
-          </a:xfrm>
-          <a:prstGeom prst="rect">
-            <a:avLst/>
-          </a:prstGeom>
-          <a:solidFill>
-            <a:srgbClr val="FFFFFF"/>
-          </a:solidFill>
-          <a:ln>
-            <a:solidFill>
-              <a:srgbClr val="000000"/>
-            </a:solidFill>
-            <a:miter lim="800000"/>
-            <a:headEnd/>
-            <a:tailEnd/>
-          </a:ln>
-        </p:spPr>
-      </p:sp>
-      <p:sp>
-        <p:nvSpPr>
-          <p:cNvPr id="322563" name="Rectangle 3"/>
-          <p:cNvSpPr>
-            <a:spLocks noGrp="1" noChangeArrowheads="1"/>
-          </p:cNvSpPr>
-          <p:nvPr>
-            <p:ph type="body" idx="1"/>
-          </p:nvPr>
-        </p:nvSpPr>
-        <p:spPr bwMode="auto">
-          <a:xfrm>
-            <a:off x="914400" y="4343400"/>
-            <a:ext cx="5029200" cy="4114800"/>
-          </a:xfrm>
-          <a:prstGeom prst="rect">
-            <a:avLst/>
-          </a:prstGeom>
-          <a:solidFill>
-            <a:srgbClr val="FFFFFF"/>
-          </a:solidFill>
-          <a:ln>
-            <a:solidFill>
-              <a:srgbClr val="000000"/>
-            </a:solidFill>
-            <a:miter lim="800000"/>
-            <a:headEnd/>
-            <a:tailEnd/>
-          </a:ln>
-        </p:spPr>
-        <p:txBody>
-          <a:bodyPr>
-            <a:prstTxWarp prst="textNoShape">
-              <a:avLst/>
-            </a:prstTxWarp>
-          </a:bodyPr>
-          <a:lstStyle/>
-          <a:p>
-            <a:endParaRPr lang="en-US"/>
-          </a:p>
-        </p:txBody>
-      </p:sp>
-    </p:spTree>
-  </p:cSld>
-  <p:clrMapOvr>
-    <a:masterClrMapping/>
-  </p:clrMapOvr>
-</p:notes>
-</file>
-
 <file path=ppt/notesSlides/notesSlide2.xml><?xml version="1.0" encoding="utf-8"?>
 <p:notes xmlns:a="http://schemas.openxmlformats.org/drawingml/2006/main" xmlns:r="http://schemas.openxmlformats.org/officeDocument/2006/relationships" xmlns:p="http://schemas.openxmlformats.org/presentationml/2006/main">
   <p:cSld>
@@ -1873,7 +1493,7 @@
           <a:bodyPr/>
           <a:lstStyle/>
           <a:p>
-            <a:fld id="{84AC5126-69CC-A249-B5B2-DD67B3648291}" type="slidenum">
+            <a:fld id="{547073D5-5905-E744-A8B1-34206A4D9A0E}" type="slidenum">
               <a:rPr lang="en-US"/>
               <a:pPr/>
               <a:t>9</a:t>
@@ -1884,21 +1504,38 @@
       </p:sp>
       <p:sp>
         <p:nvSpPr>
-          <p:cNvPr id="299010" name="Rectangle 2"/>
+          <p:cNvPr id="322562" name="Rectangle 2"/>
           <p:cNvSpPr>
-            <a:spLocks noGrp="1" noRot="1" noChangeAspect="1" noChangeArrowheads="1" noTextEdit="1"/>
+            <a:spLocks noGrp="1" noRot="1" noChangeAspect="1" noChangeArrowheads="1"/>
           </p:cNvSpPr>
           <p:nvPr>
             <p:ph type="sldImg"/>
           </p:nvPr>
         </p:nvSpPr>
-        <p:spPr>
-          <a:ln/>
+        <p:spPr bwMode="auto">
+          <a:xfrm>
+            <a:off x="1143000" y="685800"/>
+            <a:ext cx="4572000" cy="3429000"/>
+          </a:xfrm>
+          <a:prstGeom prst="rect">
+            <a:avLst/>
+          </a:prstGeom>
+          <a:solidFill>
+            <a:srgbClr val="FFFFFF"/>
+          </a:solidFill>
+          <a:ln>
+            <a:solidFill>
+              <a:srgbClr val="000000"/>
+            </a:solidFill>
+            <a:miter lim="800000"/>
+            <a:headEnd/>
+            <a:tailEnd/>
+          </a:ln>
         </p:spPr>
       </p:sp>
       <p:sp>
         <p:nvSpPr>
-          <p:cNvPr id="299011" name="Rectangle 3"/>
+          <p:cNvPr id="322563" name="Rectangle 3"/>
           <p:cNvSpPr>
             <a:spLocks noGrp="1" noChangeArrowheads="1"/>
           </p:cNvSpPr>
@@ -1906,9 +1543,32 @@
             <p:ph type="body" idx="1"/>
           </p:nvPr>
         </p:nvSpPr>
-        <p:spPr/>
-        <p:txBody>
-          <a:bodyPr/>
+        <p:spPr bwMode="auto">
+          <a:xfrm>
+            <a:off x="914400" y="4343400"/>
+            <a:ext cx="5029200" cy="4114800"/>
+          </a:xfrm>
+          <a:prstGeom prst="rect">
+            <a:avLst/>
+          </a:prstGeom>
+          <a:solidFill>
+            <a:srgbClr val="FFFFFF"/>
+          </a:solidFill>
+          <a:ln>
+            <a:solidFill>
+              <a:srgbClr val="000000"/>
+            </a:solidFill>
+            <a:miter lim="800000"/>
+            <a:headEnd/>
+            <a:tailEnd/>
+          </a:ln>
+        </p:spPr>
+        <p:txBody>
+          <a:bodyPr>
+            <a:prstTxWarp prst="textNoShape">
+              <a:avLst/>
+            </a:prstTxWarp>
+          </a:bodyPr>
           <a:lstStyle/>
           <a:p>
             <a:endParaRPr lang="en-US"/>
@@ -5243,1173 +4903,6 @@
   <p:clrMapOvr>
     <a:masterClrMapping/>
   </p:clrMapOvr>
-</p:sld>
-</file>
-
-<file path=ppt/slides/slide10.xml><?xml version="1.0" encoding="utf-8"?>
-<p:sld xmlns:a="http://schemas.openxmlformats.org/drawingml/2006/main" xmlns:r="http://schemas.openxmlformats.org/officeDocument/2006/relationships" xmlns:p="http://schemas.openxmlformats.org/presentationml/2006/main">
-  <p:cSld>
-    <p:spTree>
-      <p:nvGrpSpPr>
-        <p:cNvPr id="1" name=""/>
-        <p:cNvGrpSpPr/>
-        <p:nvPr/>
-      </p:nvGrpSpPr>
-      <p:grpSpPr>
-        <a:xfrm>
-          <a:off x="0" y="0"/>
-          <a:ext cx="0" cy="0"/>
-          <a:chOff x="0" y="0"/>
-          <a:chExt cx="0" cy="0"/>
-        </a:xfrm>
-      </p:grpSpPr>
-      <p:sp>
-        <p:nvSpPr>
-          <p:cNvPr id="203780" name="Rectangle 4"/>
-          <p:cNvSpPr>
-            <a:spLocks noGrp="1" noChangeArrowheads="1"/>
-          </p:cNvSpPr>
-          <p:nvPr>
-            <p:ph type="title"/>
-          </p:nvPr>
-        </p:nvSpPr>
-        <p:spPr/>
-        <p:txBody>
-          <a:bodyPr/>
-          <a:lstStyle/>
-          <a:p>
-            <a:r>
-              <a:rPr lang="en-US"/>
-              <a:t>Conflicts revisited (cont’d)</a:t>
-            </a:r>
-          </a:p>
-        </p:txBody>
-      </p:sp>
-      <p:sp>
-        <p:nvSpPr>
-          <p:cNvPr id="203781" name="Rectangle 5"/>
-          <p:cNvSpPr>
-            <a:spLocks noGrp="1" noChangeArrowheads="1"/>
-          </p:cNvSpPr>
-          <p:nvPr>
-            <p:ph idx="1"/>
-          </p:nvPr>
-        </p:nvSpPr>
-        <p:spPr/>
-        <p:txBody>
-          <a:bodyPr/>
-          <a:lstStyle/>
-          <a:p>
-            <a:pPr>
-              <a:lnSpc>
-                <a:spcPct val="90000"/>
-              </a:lnSpc>
-            </a:pPr>
-            <a:r>
-              <a:rPr lang="en-US" sz="2800" dirty="0"/>
-              <a:t>Can the grammar be rearranged so that the conflict disappears? </a:t>
-            </a:r>
-          </a:p>
-          <a:p>
-            <a:pPr lvl="1">
-              <a:lnSpc>
-                <a:spcPct val="90000"/>
-              </a:lnSpc>
-            </a:pPr>
-            <a:r>
-              <a:rPr lang="en-US" sz="2400"/>
-              <a:t>Yes</a:t>
-            </a:r>
-            <a:r>
-              <a:rPr lang="en-US" sz="2400" dirty="0"/>
-              <a:t>:  Is it worth it?</a:t>
-            </a:r>
-          </a:p>
-          <a:p>
-            <a:pPr lvl="2">
-              <a:lnSpc>
-                <a:spcPct val="90000"/>
-              </a:lnSpc>
-            </a:pPr>
-            <a:r>
-              <a:rPr lang="en-US" sz="2000" dirty="0"/>
-              <a:t>Yes, resolve conflict.</a:t>
-            </a:r>
-          </a:p>
-          <a:p>
-            <a:pPr lvl="2">
-              <a:lnSpc>
-                <a:spcPct val="90000"/>
-              </a:lnSpc>
-            </a:pPr>
-            <a:r>
-              <a:rPr lang="en-US" sz="2000" dirty="0"/>
-              <a:t>No: live with default or specified conflict resolution (precedence, associativity)</a:t>
-            </a:r>
-          </a:p>
-        </p:txBody>
-      </p:sp>
-      <p:sp>
-        <p:nvSpPr>
-          <p:cNvPr id="5" name="Slide Number Placeholder 5"/>
-          <p:cNvSpPr>
-            <a:spLocks noGrp="1"/>
-          </p:cNvSpPr>
-          <p:nvPr>
-            <p:ph type="sldNum" sz="quarter" idx="12"/>
-          </p:nvPr>
-        </p:nvSpPr>
-        <p:spPr/>
-        <p:txBody>
-          <a:bodyPr/>
-          <a:lstStyle/>
-          <a:p>
-            <a:fld id="{AC22A79E-81E8-E34A-B0B5-024F0F08E679}" type="slidenum">
-              <a:rPr lang="en-US"/>
-              <a:pPr/>
-              <a:t>10</a:t>
-            </a:fld>
-            <a:endParaRPr lang="en-US"/>
-          </a:p>
-        </p:txBody>
-      </p:sp>
-    </p:spTree>
-  </p:cSld>
-  <p:clrMapOvr>
-    <a:masterClrMapping/>
-  </p:clrMapOvr>
-  <p:timing>
-    <p:tnLst>
-      <p:par>
-        <p:cTn id="1" dur="indefinite" restart="never" nodeType="tmRoot">
-          <p:childTnLst>
-            <p:seq concurrent="1" nextAc="seek">
-              <p:cTn id="2" dur="indefinite" nodeType="mainSeq">
-                <p:childTnLst>
-                  <p:par>
-                    <p:cTn id="3" fill="hold">
-                      <p:stCondLst>
-                        <p:cond delay="indefinite"/>
-                      </p:stCondLst>
-                      <p:childTnLst>
-                        <p:par>
-                          <p:cTn id="4" fill="hold">
-                            <p:stCondLst>
-                              <p:cond delay="0"/>
-                            </p:stCondLst>
-                            <p:childTnLst>
-                              <p:par>
-                                <p:cTn id="5" presetID="1" presetClass="entr" presetSubtype="0" fill="hold" grpId="0" nodeType="clickEffect">
-                                  <p:stCondLst>
-                                    <p:cond delay="0"/>
-                                  </p:stCondLst>
-                                  <p:childTnLst>
-                                    <p:set>
-                                      <p:cBhvr>
-                                        <p:cTn id="6" dur="1" fill="hold">
-                                          <p:stCondLst>
-                                            <p:cond delay="499"/>
-                                          </p:stCondLst>
-                                        </p:cTn>
-                                        <p:tgtEl>
-                                          <p:spTgt spid="203781">
-                                            <p:txEl>
-                                              <p:pRg st="0" end="0"/>
-                                            </p:txEl>
-                                          </p:spTgt>
-                                        </p:tgtEl>
-                                        <p:attrNameLst>
-                                          <p:attrName>style.visibility</p:attrName>
-                                        </p:attrNameLst>
-                                      </p:cBhvr>
-                                      <p:to>
-                                        <p:strVal val="visible"/>
-                                      </p:to>
-                                    </p:set>
-                                  </p:childTnLst>
-                                </p:cTn>
-                              </p:par>
-                            </p:childTnLst>
-                          </p:cTn>
-                        </p:par>
-                      </p:childTnLst>
-                    </p:cTn>
-                  </p:par>
-                  <p:par>
-                    <p:cTn id="7" fill="hold">
-                      <p:stCondLst>
-                        <p:cond delay="indefinite"/>
-                      </p:stCondLst>
-                      <p:childTnLst>
-                        <p:par>
-                          <p:cTn id="8" fill="hold">
-                            <p:stCondLst>
-                              <p:cond delay="0"/>
-                            </p:stCondLst>
-                            <p:childTnLst>
-                              <p:par>
-                                <p:cTn id="9" presetID="1" presetClass="entr" presetSubtype="0" fill="hold" grpId="0" nodeType="clickEffect">
-                                  <p:stCondLst>
-                                    <p:cond delay="0"/>
-                                  </p:stCondLst>
-                                  <p:childTnLst>
-                                    <p:set>
-                                      <p:cBhvr>
-                                        <p:cTn id="10" dur="1" fill="hold">
-                                          <p:stCondLst>
-                                            <p:cond delay="499"/>
-                                          </p:stCondLst>
-                                        </p:cTn>
-                                        <p:tgtEl>
-                                          <p:spTgt spid="203781">
-                                            <p:txEl>
-                                              <p:pRg st="1" end="1"/>
-                                            </p:txEl>
-                                          </p:spTgt>
-                                        </p:tgtEl>
-                                        <p:attrNameLst>
-                                          <p:attrName>style.visibility</p:attrName>
-                                        </p:attrNameLst>
-                                      </p:cBhvr>
-                                      <p:to>
-                                        <p:strVal val="visible"/>
-                                      </p:to>
-                                    </p:set>
-                                  </p:childTnLst>
-                                </p:cTn>
-                              </p:par>
-                            </p:childTnLst>
-                          </p:cTn>
-                        </p:par>
-                      </p:childTnLst>
-                    </p:cTn>
-                  </p:par>
-                  <p:par>
-                    <p:cTn id="11" fill="hold">
-                      <p:stCondLst>
-                        <p:cond delay="indefinite"/>
-                      </p:stCondLst>
-                      <p:childTnLst>
-                        <p:par>
-                          <p:cTn id="12" fill="hold">
-                            <p:stCondLst>
-                              <p:cond delay="0"/>
-                            </p:stCondLst>
-                            <p:childTnLst>
-                              <p:par>
-                                <p:cTn id="13" presetID="1" presetClass="entr" presetSubtype="0" fill="hold" grpId="0" nodeType="clickEffect">
-                                  <p:stCondLst>
-                                    <p:cond delay="0"/>
-                                  </p:stCondLst>
-                                  <p:childTnLst>
-                                    <p:set>
-                                      <p:cBhvr>
-                                        <p:cTn id="14" dur="1" fill="hold">
-                                          <p:stCondLst>
-                                            <p:cond delay="499"/>
-                                          </p:stCondLst>
-                                        </p:cTn>
-                                        <p:tgtEl>
-                                          <p:spTgt spid="203781">
-                                            <p:txEl>
-                                              <p:pRg st="2" end="2"/>
-                                            </p:txEl>
-                                          </p:spTgt>
-                                        </p:tgtEl>
-                                        <p:attrNameLst>
-                                          <p:attrName>style.visibility</p:attrName>
-                                        </p:attrNameLst>
-                                      </p:cBhvr>
-                                      <p:to>
-                                        <p:strVal val="visible"/>
-                                      </p:to>
-                                    </p:set>
-                                  </p:childTnLst>
-                                </p:cTn>
-                              </p:par>
-                            </p:childTnLst>
-                          </p:cTn>
-                        </p:par>
-                      </p:childTnLst>
-                    </p:cTn>
-                  </p:par>
-                  <p:par>
-                    <p:cTn id="15" fill="hold">
-                      <p:stCondLst>
-                        <p:cond delay="indefinite"/>
-                      </p:stCondLst>
-                      <p:childTnLst>
-                        <p:par>
-                          <p:cTn id="16" fill="hold">
-                            <p:stCondLst>
-                              <p:cond delay="0"/>
-                            </p:stCondLst>
-                            <p:childTnLst>
-                              <p:par>
-                                <p:cTn id="17" presetID="1" presetClass="entr" presetSubtype="0" fill="hold" grpId="0" nodeType="clickEffect">
-                                  <p:stCondLst>
-                                    <p:cond delay="0"/>
-                                  </p:stCondLst>
-                                  <p:childTnLst>
-                                    <p:set>
-                                      <p:cBhvr>
-                                        <p:cTn id="18" dur="1" fill="hold">
-                                          <p:stCondLst>
-                                            <p:cond delay="499"/>
-                                          </p:stCondLst>
-                                        </p:cTn>
-                                        <p:tgtEl>
-                                          <p:spTgt spid="203781">
-                                            <p:txEl>
-                                              <p:pRg st="3" end="3"/>
-                                            </p:txEl>
-                                          </p:spTgt>
-                                        </p:tgtEl>
-                                        <p:attrNameLst>
-                                          <p:attrName>style.visibility</p:attrName>
-                                        </p:attrNameLst>
-                                      </p:cBhvr>
-                                      <p:to>
-                                        <p:strVal val="visible"/>
-                                      </p:to>
-                                    </p:set>
-                                  </p:childTnLst>
-                                </p:cTn>
-                              </p:par>
-                            </p:childTnLst>
-                          </p:cTn>
-                        </p:par>
-                      </p:childTnLst>
-                    </p:cTn>
-                  </p:par>
-                </p:childTnLst>
-              </p:cTn>
-              <p:prevCondLst>
-                <p:cond evt="onPrev" delay="0">
-                  <p:tgtEl>
-                    <p:sldTgt/>
-                  </p:tgtEl>
-                </p:cond>
-              </p:prevCondLst>
-              <p:nextCondLst>
-                <p:cond evt="onNext" delay="0">
-                  <p:tgtEl>
-                    <p:sldTgt/>
-                  </p:tgtEl>
-                </p:cond>
-              </p:nextCondLst>
-            </p:seq>
-          </p:childTnLst>
-        </p:cTn>
-      </p:par>
-    </p:tnLst>
-    <p:bldLst>
-      <p:bldP spid="203781" grpId="0" build="p" bldLvl="3" autoUpdateAnimBg="0"/>
-    </p:bldLst>
-  </p:timing>
-</p:sld>
-</file>
-
-<file path=ppt/slides/slide11.xml><?xml version="1.0" encoding="utf-8"?>
-<p:sld xmlns:a="http://schemas.openxmlformats.org/drawingml/2006/main" xmlns:r="http://schemas.openxmlformats.org/officeDocument/2006/relationships" xmlns:p="http://schemas.openxmlformats.org/presentationml/2006/main">
-  <p:cSld>
-    <p:spTree>
-      <p:nvGrpSpPr>
-        <p:cNvPr id="1" name=""/>
-        <p:cNvGrpSpPr/>
-        <p:nvPr/>
-      </p:nvGrpSpPr>
-      <p:grpSpPr>
-        <a:xfrm>
-          <a:off x="0" y="0"/>
-          <a:ext cx="0" cy="0"/>
-          <a:chOff x="0" y="0"/>
-          <a:chExt cx="0" cy="0"/>
-        </a:xfrm>
-      </p:grpSpPr>
-      <p:sp>
-        <p:nvSpPr>
-          <p:cNvPr id="355332" name="Rectangle 4"/>
-          <p:cNvSpPr>
-            <a:spLocks noGrp="1" noChangeArrowheads="1"/>
-          </p:cNvSpPr>
-          <p:nvPr>
-            <p:ph type="title"/>
-          </p:nvPr>
-        </p:nvSpPr>
-        <p:spPr/>
-        <p:txBody>
-          <a:bodyPr/>
-          <a:lstStyle/>
-          <a:p>
-            <a:r>
-              <a:rPr lang="en-US"/>
-              <a:t>Compiler (parser) compilers</a:t>
-            </a:r>
-          </a:p>
-        </p:txBody>
-      </p:sp>
-      <p:sp>
-        <p:nvSpPr>
-          <p:cNvPr id="355333" name="Rectangle 5"/>
-          <p:cNvSpPr>
-            <a:spLocks noGrp="1" noChangeArrowheads="1"/>
-          </p:cNvSpPr>
-          <p:nvPr>
-            <p:ph idx="1"/>
-          </p:nvPr>
-        </p:nvSpPr>
-        <p:spPr/>
-        <p:txBody>
-          <a:bodyPr/>
-          <a:lstStyle/>
-          <a:p>
-            <a:pPr>
-              <a:lnSpc>
-                <a:spcPct val="90000"/>
-              </a:lnSpc>
-            </a:pPr>
-            <a:r>
-              <a:rPr lang="en-US"/>
-              <a:t>Rather than build a parser for a particular grammar (e.g. recursive descent), write down a grammar as a text file</a:t>
-            </a:r>
-          </a:p>
-          <a:p>
-            <a:pPr>
-              <a:lnSpc>
-                <a:spcPct val="90000"/>
-              </a:lnSpc>
-            </a:pPr>
-            <a:r>
-              <a:rPr lang="en-US"/>
-              <a:t>Run through a compiler compiler which produces a parser for that grammar</a:t>
-            </a:r>
-          </a:p>
-          <a:p>
-            <a:pPr>
-              <a:lnSpc>
-                <a:spcPct val="90000"/>
-              </a:lnSpc>
-            </a:pPr>
-            <a:r>
-              <a:rPr lang="en-US"/>
-              <a:t>The parser is a program that can be compiled and accepts input strings and produces user-defined output</a:t>
-            </a:r>
-          </a:p>
-        </p:txBody>
-      </p:sp>
-      <p:sp>
-        <p:nvSpPr>
-          <p:cNvPr id="5" name="Slide Number Placeholder 5"/>
-          <p:cNvSpPr>
-            <a:spLocks noGrp="1"/>
-          </p:cNvSpPr>
-          <p:nvPr>
-            <p:ph type="sldNum" sz="quarter" idx="12"/>
-          </p:nvPr>
-        </p:nvSpPr>
-        <p:spPr/>
-        <p:txBody>
-          <a:bodyPr/>
-          <a:lstStyle/>
-          <a:p>
-            <a:fld id="{58226EF5-9E27-8D48-9CE5-A75F4AB57B26}" type="slidenum">
-              <a:rPr lang="en-US"/>
-              <a:pPr/>
-              <a:t>11</a:t>
-            </a:fld>
-            <a:endParaRPr lang="en-US"/>
-          </a:p>
-        </p:txBody>
-      </p:sp>
-    </p:spTree>
-  </p:cSld>
-  <p:clrMapOvr>
-    <a:masterClrMapping/>
-  </p:clrMapOvr>
-</p:sld>
-</file>
-
-<file path=ppt/slides/slide12.xml><?xml version="1.0" encoding="utf-8"?>
-<p:sld xmlns:a="http://schemas.openxmlformats.org/drawingml/2006/main" xmlns:r="http://schemas.openxmlformats.org/officeDocument/2006/relationships" xmlns:p="http://schemas.openxmlformats.org/presentationml/2006/main">
-  <p:cSld>
-    <p:spTree>
-      <p:nvGrpSpPr>
-        <p:cNvPr id="1" name=""/>
-        <p:cNvGrpSpPr/>
-        <p:nvPr/>
-      </p:nvGrpSpPr>
-      <p:grpSpPr>
-        <a:xfrm>
-          <a:off x="0" y="0"/>
-          <a:ext cx="0" cy="0"/>
-          <a:chOff x="0" y="0"/>
-          <a:chExt cx="0" cy="0"/>
-        </a:xfrm>
-      </p:grpSpPr>
-      <p:sp>
-        <p:nvSpPr>
-          <p:cNvPr id="356354" name="Rectangle 2"/>
-          <p:cNvSpPr>
-            <a:spLocks noGrp="1" noChangeArrowheads="1"/>
-          </p:cNvSpPr>
-          <p:nvPr>
-            <p:ph type="title"/>
-          </p:nvPr>
-        </p:nvSpPr>
-        <p:spPr/>
-        <p:txBody>
-          <a:bodyPr/>
-          <a:lstStyle/>
-          <a:p>
-            <a:r>
-              <a:rPr lang="en-US"/>
-              <a:t>Compiler (parser) compilers</a:t>
-            </a:r>
-          </a:p>
-        </p:txBody>
-      </p:sp>
-      <p:sp>
-        <p:nvSpPr>
-          <p:cNvPr id="356355" name="Rectangle 3"/>
-          <p:cNvSpPr>
-            <a:spLocks noGrp="1" noChangeArrowheads="1"/>
-          </p:cNvSpPr>
-          <p:nvPr>
-            <p:ph idx="1"/>
-          </p:nvPr>
-        </p:nvSpPr>
-        <p:spPr/>
-        <p:txBody>
-          <a:bodyPr/>
-          <a:lstStyle/>
-          <a:p>
-            <a:pPr>
-              <a:lnSpc>
-                <a:spcPct val="90000"/>
-              </a:lnSpc>
-            </a:pPr>
-            <a:r>
-              <a:rPr lang="en-US" sz="2800"/>
-              <a:t>For LR parsing, all it needs to do is produce action/goto table</a:t>
-            </a:r>
-          </a:p>
-          <a:p>
-            <a:pPr lvl="1">
-              <a:lnSpc>
-                <a:spcPct val="90000"/>
-              </a:lnSpc>
-            </a:pPr>
-            <a:r>
-              <a:rPr lang="en-US" sz="2400"/>
-              <a:t>Yacc (yet another compiler compiler) was distributed with Unix, the most popular tool. Uses LALR(1). </a:t>
-            </a:r>
-          </a:p>
-          <a:p>
-            <a:pPr lvl="1">
-              <a:lnSpc>
-                <a:spcPct val="90000"/>
-              </a:lnSpc>
-            </a:pPr>
-            <a:r>
-              <a:rPr lang="en-US" sz="2400"/>
-              <a:t>Many variants of yacc exist for many languages</a:t>
-            </a:r>
-          </a:p>
-          <a:p>
-            <a:pPr>
-              <a:lnSpc>
-                <a:spcPct val="90000"/>
-              </a:lnSpc>
-            </a:pPr>
-            <a:r>
-              <a:rPr lang="en-US" sz="2800"/>
-              <a:t>As we will see later, translation of the parse tree into machine code (or anything else) can also be written down with the grammar</a:t>
-            </a:r>
-          </a:p>
-          <a:p>
-            <a:pPr>
-              <a:lnSpc>
-                <a:spcPct val="90000"/>
-              </a:lnSpc>
-            </a:pPr>
-            <a:r>
-              <a:rPr lang="en-US" sz="2800"/>
-              <a:t>Handling errors and interaction with the lexical analyzer have to be precisely defined</a:t>
-            </a:r>
-          </a:p>
-        </p:txBody>
-      </p:sp>
-      <p:sp>
-        <p:nvSpPr>
-          <p:cNvPr id="5" name="Slide Number Placeholder 5"/>
-          <p:cNvSpPr>
-            <a:spLocks noGrp="1"/>
-          </p:cNvSpPr>
-          <p:nvPr>
-            <p:ph type="sldNum" sz="quarter" idx="12"/>
-          </p:nvPr>
-        </p:nvSpPr>
-        <p:spPr/>
-        <p:txBody>
-          <a:bodyPr/>
-          <a:lstStyle/>
-          <a:p>
-            <a:fld id="{47B9252A-C43C-3A4E-B252-56E04C74C125}" type="slidenum">
-              <a:rPr lang="en-US"/>
-              <a:pPr/>
-              <a:t>12</a:t>
-            </a:fld>
-            <a:endParaRPr lang="en-US"/>
-          </a:p>
-        </p:txBody>
-      </p:sp>
-    </p:spTree>
-  </p:cSld>
-  <p:clrMapOvr>
-    <a:masterClrMapping/>
-  </p:clrMapOvr>
-</p:sld>
-</file>
-
-<file path=ppt/slides/slide13.xml><?xml version="1.0" encoding="utf-8"?>
-<p:sld xmlns:a="http://schemas.openxmlformats.org/drawingml/2006/main" xmlns:r="http://schemas.openxmlformats.org/officeDocument/2006/relationships" xmlns:p="http://schemas.openxmlformats.org/presentationml/2006/main">
-  <p:cSld>
-    <p:spTree>
-      <p:nvGrpSpPr>
-        <p:cNvPr id="1" name=""/>
-        <p:cNvGrpSpPr/>
-        <p:nvPr/>
-      </p:nvGrpSpPr>
-      <p:grpSpPr>
-        <a:xfrm>
-          <a:off x="0" y="0"/>
-          <a:ext cx="0" cy="0"/>
-          <a:chOff x="0" y="0"/>
-          <a:chExt cx="0" cy="0"/>
-        </a:xfrm>
-      </p:grpSpPr>
-      <p:sp>
-        <p:nvSpPr>
-          <p:cNvPr id="321538" name="Rectangle 2"/>
-          <p:cNvSpPr>
-            <a:spLocks noGrp="1" noChangeArrowheads="1"/>
-          </p:cNvSpPr>
-          <p:nvPr>
-            <p:ph type="title"/>
-          </p:nvPr>
-        </p:nvSpPr>
-        <p:spPr/>
-        <p:txBody>
-          <a:bodyPr/>
-          <a:lstStyle/>
-          <a:p>
-            <a:r>
-              <a:rPr lang="en-US"/>
-              <a:t>Parsing - Summary</a:t>
-            </a:r>
-          </a:p>
-        </p:txBody>
-      </p:sp>
-      <p:sp>
-        <p:nvSpPr>
-          <p:cNvPr id="321539" name="Rectangle 3"/>
-          <p:cNvSpPr>
-            <a:spLocks noGrp="1" noChangeArrowheads="1"/>
-          </p:cNvSpPr>
-          <p:nvPr>
-            <p:ph idx="1"/>
-          </p:nvPr>
-        </p:nvSpPr>
-        <p:spPr/>
-        <p:txBody>
-          <a:bodyPr/>
-          <a:lstStyle/>
-          <a:p>
-            <a:r>
-              <a:rPr lang="en-US" sz="2800"/>
-              <a:t>Top-down vs. bottom-up</a:t>
-            </a:r>
-          </a:p>
-          <a:p>
-            <a:r>
-              <a:rPr lang="en-US" sz="2800"/>
-              <a:t>Lookahead: FIRST and FOLLOW sets</a:t>
-            </a:r>
-          </a:p>
-          <a:p>
-            <a:r>
-              <a:rPr lang="en-US" sz="2800"/>
-              <a:t>LL(1) – Parsing: </a:t>
-            </a:r>
-            <a:r>
-              <a:rPr lang="en-US" sz="2800" i="1"/>
-              <a:t>O</a:t>
-            </a:r>
-            <a:r>
-              <a:rPr lang="en-US" sz="2800"/>
-              <a:t>(</a:t>
-            </a:r>
-            <a:r>
-              <a:rPr lang="en-US" sz="2800" i="1"/>
-              <a:t>n</a:t>
-            </a:r>
-            <a:r>
-              <a:rPr lang="en-US" sz="2800"/>
-              <a:t>) time complexity</a:t>
-            </a:r>
-          </a:p>
-          <a:p>
-            <a:pPr lvl="1"/>
-            <a:r>
-              <a:rPr lang="en-US" sz="2400"/>
-              <a:t>recursive-descent and table-driven predictive parsing</a:t>
-            </a:r>
-          </a:p>
-          <a:p>
-            <a:r>
-              <a:rPr lang="en-US" sz="2800"/>
-              <a:t>LR(k) – Parsing : </a:t>
-            </a:r>
-            <a:r>
-              <a:rPr lang="en-US" sz="2800" i="1"/>
-              <a:t>O</a:t>
-            </a:r>
-            <a:r>
-              <a:rPr lang="en-US" sz="2800"/>
-              <a:t>(</a:t>
-            </a:r>
-            <a:r>
-              <a:rPr lang="en-US" sz="2800" i="1"/>
-              <a:t>n</a:t>
-            </a:r>
-            <a:r>
-              <a:rPr lang="en-US" sz="2800"/>
-              <a:t>) time complexity</a:t>
-            </a:r>
-          </a:p>
-          <a:p>
-            <a:pPr lvl="1"/>
-            <a:r>
-              <a:rPr lang="en-US" sz="2400"/>
-              <a:t>LR(0), SLR(1), LR(1), LALR(1)</a:t>
-            </a:r>
-          </a:p>
-          <a:p>
-            <a:r>
-              <a:rPr lang="en-US" sz="2800"/>
-              <a:t>Resolving shift/reduce conflicts</a:t>
-            </a:r>
-          </a:p>
-          <a:p>
-            <a:pPr lvl="1"/>
-            <a:r>
-              <a:rPr lang="en-US" sz="2400"/>
-              <a:t>using precedence, associativity</a:t>
-            </a:r>
-          </a:p>
-        </p:txBody>
-      </p:sp>
-      <p:sp>
-        <p:nvSpPr>
-          <p:cNvPr id="5" name="Slide Number Placeholder 5"/>
-          <p:cNvSpPr>
-            <a:spLocks noGrp="1"/>
-          </p:cNvSpPr>
-          <p:nvPr>
-            <p:ph type="sldNum" sz="quarter" idx="12"/>
-          </p:nvPr>
-        </p:nvSpPr>
-        <p:spPr/>
-        <p:txBody>
-          <a:bodyPr/>
-          <a:lstStyle/>
-          <a:p>
-            <a:fld id="{1E9954E9-0610-7043-B023-2390B0BF7BBC}" type="slidenum">
-              <a:rPr lang="en-US"/>
-              <a:pPr/>
-              <a:t>13</a:t>
-            </a:fld>
-            <a:endParaRPr lang="en-US"/>
-          </a:p>
-        </p:txBody>
-      </p:sp>
-    </p:spTree>
-  </p:cSld>
-  <p:clrMapOvr>
-    <a:masterClrMapping/>
-  </p:clrMapOvr>
-  <p:timing>
-    <p:tnLst>
-      <p:par>
-        <p:cTn id="1" dur="indefinite" restart="never" nodeType="tmRoot">
-          <p:childTnLst>
-            <p:seq concurrent="1" nextAc="seek">
-              <p:cTn id="2" dur="indefinite" nodeType="mainSeq">
-                <p:childTnLst>
-                  <p:par>
-                    <p:cTn id="3" fill="hold">
-                      <p:stCondLst>
-                        <p:cond delay="indefinite"/>
-                      </p:stCondLst>
-                      <p:childTnLst>
-                        <p:par>
-                          <p:cTn id="4" fill="hold">
-                            <p:stCondLst>
-                              <p:cond delay="0"/>
-                            </p:stCondLst>
-                            <p:childTnLst>
-                              <p:par>
-                                <p:cTn id="5" presetID="1" presetClass="entr" presetSubtype="0" fill="hold" grpId="0" nodeType="clickEffect">
-                                  <p:stCondLst>
-                                    <p:cond delay="0"/>
-                                  </p:stCondLst>
-                                  <p:childTnLst>
-                                    <p:set>
-                                      <p:cBhvr>
-                                        <p:cTn id="6" dur="1" fill="hold">
-                                          <p:stCondLst>
-                                            <p:cond delay="499"/>
-                                          </p:stCondLst>
-                                        </p:cTn>
-                                        <p:tgtEl>
-                                          <p:spTgt spid="321539">
-                                            <p:txEl>
-                                              <p:pRg st="0" end="0"/>
-                                            </p:txEl>
-                                          </p:spTgt>
-                                        </p:tgtEl>
-                                        <p:attrNameLst>
-                                          <p:attrName>style.visibility</p:attrName>
-                                        </p:attrNameLst>
-                                      </p:cBhvr>
-                                      <p:to>
-                                        <p:strVal val="visible"/>
-                                      </p:to>
-                                    </p:set>
-                                  </p:childTnLst>
-                                </p:cTn>
-                              </p:par>
-                            </p:childTnLst>
-                          </p:cTn>
-                        </p:par>
-                      </p:childTnLst>
-                    </p:cTn>
-                  </p:par>
-                  <p:par>
-                    <p:cTn id="7" fill="hold">
-                      <p:stCondLst>
-                        <p:cond delay="indefinite"/>
-                      </p:stCondLst>
-                      <p:childTnLst>
-                        <p:par>
-                          <p:cTn id="8" fill="hold">
-                            <p:stCondLst>
-                              <p:cond delay="0"/>
-                            </p:stCondLst>
-                            <p:childTnLst>
-                              <p:par>
-                                <p:cTn id="9" presetID="1" presetClass="entr" presetSubtype="0" fill="hold" grpId="0" nodeType="clickEffect">
-                                  <p:stCondLst>
-                                    <p:cond delay="0"/>
-                                  </p:stCondLst>
-                                  <p:childTnLst>
-                                    <p:set>
-                                      <p:cBhvr>
-                                        <p:cTn id="10" dur="1" fill="hold">
-                                          <p:stCondLst>
-                                            <p:cond delay="499"/>
-                                          </p:stCondLst>
-                                        </p:cTn>
-                                        <p:tgtEl>
-                                          <p:spTgt spid="321539">
-                                            <p:txEl>
-                                              <p:pRg st="1" end="1"/>
-                                            </p:txEl>
-                                          </p:spTgt>
-                                        </p:tgtEl>
-                                        <p:attrNameLst>
-                                          <p:attrName>style.visibility</p:attrName>
-                                        </p:attrNameLst>
-                                      </p:cBhvr>
-                                      <p:to>
-                                        <p:strVal val="visible"/>
-                                      </p:to>
-                                    </p:set>
-                                  </p:childTnLst>
-                                </p:cTn>
-                              </p:par>
-                            </p:childTnLst>
-                          </p:cTn>
-                        </p:par>
-                      </p:childTnLst>
-                    </p:cTn>
-                  </p:par>
-                  <p:par>
-                    <p:cTn id="11" fill="hold">
-                      <p:stCondLst>
-                        <p:cond delay="indefinite"/>
-                      </p:stCondLst>
-                      <p:childTnLst>
-                        <p:par>
-                          <p:cTn id="12" fill="hold">
-                            <p:stCondLst>
-                              <p:cond delay="0"/>
-                            </p:stCondLst>
-                            <p:childTnLst>
-                              <p:par>
-                                <p:cTn id="13" presetID="1" presetClass="entr" presetSubtype="0" fill="hold" grpId="0" nodeType="clickEffect">
-                                  <p:stCondLst>
-                                    <p:cond delay="0"/>
-                                  </p:stCondLst>
-                                  <p:childTnLst>
-                                    <p:set>
-                                      <p:cBhvr>
-                                        <p:cTn id="14" dur="1" fill="hold">
-                                          <p:stCondLst>
-                                            <p:cond delay="499"/>
-                                          </p:stCondLst>
-                                        </p:cTn>
-                                        <p:tgtEl>
-                                          <p:spTgt spid="321539">
-                                            <p:txEl>
-                                              <p:pRg st="2" end="2"/>
-                                            </p:txEl>
-                                          </p:spTgt>
-                                        </p:tgtEl>
-                                        <p:attrNameLst>
-                                          <p:attrName>style.visibility</p:attrName>
-                                        </p:attrNameLst>
-                                      </p:cBhvr>
-                                      <p:to>
-                                        <p:strVal val="visible"/>
-                                      </p:to>
-                                    </p:set>
-                                  </p:childTnLst>
-                                </p:cTn>
-                              </p:par>
-                              <p:par>
-                                <p:cTn id="15" presetID="1" presetClass="entr" presetSubtype="0" fill="hold" grpId="0" nodeType="withEffect">
-                                  <p:stCondLst>
-                                    <p:cond delay="0"/>
-                                  </p:stCondLst>
-                                  <p:childTnLst>
-                                    <p:set>
-                                      <p:cBhvr>
-                                        <p:cTn id="16" dur="1" fill="hold">
-                                          <p:stCondLst>
-                                            <p:cond delay="499"/>
-                                          </p:stCondLst>
-                                        </p:cTn>
-                                        <p:tgtEl>
-                                          <p:spTgt spid="321539">
-                                            <p:txEl>
-                                              <p:pRg st="3" end="3"/>
-                                            </p:txEl>
-                                          </p:spTgt>
-                                        </p:tgtEl>
-                                        <p:attrNameLst>
-                                          <p:attrName>style.visibility</p:attrName>
-                                        </p:attrNameLst>
-                                      </p:cBhvr>
-                                      <p:to>
-                                        <p:strVal val="visible"/>
-                                      </p:to>
-                                    </p:set>
-                                  </p:childTnLst>
-                                </p:cTn>
-                              </p:par>
-                            </p:childTnLst>
-                          </p:cTn>
-                        </p:par>
-                      </p:childTnLst>
-                    </p:cTn>
-                  </p:par>
-                  <p:par>
-                    <p:cTn id="17" fill="hold">
-                      <p:stCondLst>
-                        <p:cond delay="indefinite"/>
-                      </p:stCondLst>
-                      <p:childTnLst>
-                        <p:par>
-                          <p:cTn id="18" fill="hold">
-                            <p:stCondLst>
-                              <p:cond delay="0"/>
-                            </p:stCondLst>
-                            <p:childTnLst>
-                              <p:par>
-                                <p:cTn id="19" presetID="1" presetClass="entr" presetSubtype="0" fill="hold" grpId="0" nodeType="clickEffect">
-                                  <p:stCondLst>
-                                    <p:cond delay="0"/>
-                                  </p:stCondLst>
-                                  <p:childTnLst>
-                                    <p:set>
-                                      <p:cBhvr>
-                                        <p:cTn id="20" dur="1" fill="hold">
-                                          <p:stCondLst>
-                                            <p:cond delay="499"/>
-                                          </p:stCondLst>
-                                        </p:cTn>
-                                        <p:tgtEl>
-                                          <p:spTgt spid="321539">
-                                            <p:txEl>
-                                              <p:pRg st="4" end="4"/>
-                                            </p:txEl>
-                                          </p:spTgt>
-                                        </p:tgtEl>
-                                        <p:attrNameLst>
-                                          <p:attrName>style.visibility</p:attrName>
-                                        </p:attrNameLst>
-                                      </p:cBhvr>
-                                      <p:to>
-                                        <p:strVal val="visible"/>
-                                      </p:to>
-                                    </p:set>
-                                  </p:childTnLst>
-                                </p:cTn>
-                              </p:par>
-                              <p:par>
-                                <p:cTn id="21" presetID="1" presetClass="entr" presetSubtype="0" fill="hold" grpId="0" nodeType="withEffect">
-                                  <p:stCondLst>
-                                    <p:cond delay="0"/>
-                                  </p:stCondLst>
-                                  <p:childTnLst>
-                                    <p:set>
-                                      <p:cBhvr>
-                                        <p:cTn id="22" dur="1" fill="hold">
-                                          <p:stCondLst>
-                                            <p:cond delay="499"/>
-                                          </p:stCondLst>
-                                        </p:cTn>
-                                        <p:tgtEl>
-                                          <p:spTgt spid="321539">
-                                            <p:txEl>
-                                              <p:pRg st="5" end="5"/>
-                                            </p:txEl>
-                                          </p:spTgt>
-                                        </p:tgtEl>
-                                        <p:attrNameLst>
-                                          <p:attrName>style.visibility</p:attrName>
-                                        </p:attrNameLst>
-                                      </p:cBhvr>
-                                      <p:to>
-                                        <p:strVal val="visible"/>
-                                      </p:to>
-                                    </p:set>
-                                  </p:childTnLst>
-                                </p:cTn>
-                              </p:par>
-                            </p:childTnLst>
-                          </p:cTn>
-                        </p:par>
-                      </p:childTnLst>
-                    </p:cTn>
-                  </p:par>
-                  <p:par>
-                    <p:cTn id="23" fill="hold">
-                      <p:stCondLst>
-                        <p:cond delay="indefinite"/>
-                      </p:stCondLst>
-                      <p:childTnLst>
-                        <p:par>
-                          <p:cTn id="24" fill="hold">
-                            <p:stCondLst>
-                              <p:cond delay="0"/>
-                            </p:stCondLst>
-                            <p:childTnLst>
-                              <p:par>
-                                <p:cTn id="25" presetID="1" presetClass="entr" presetSubtype="0" fill="hold" grpId="0" nodeType="clickEffect">
-                                  <p:stCondLst>
-                                    <p:cond delay="0"/>
-                                  </p:stCondLst>
-                                  <p:childTnLst>
-                                    <p:set>
-                                      <p:cBhvr>
-                                        <p:cTn id="26" dur="1" fill="hold">
-                                          <p:stCondLst>
-                                            <p:cond delay="499"/>
-                                          </p:stCondLst>
-                                        </p:cTn>
-                                        <p:tgtEl>
-                                          <p:spTgt spid="321539">
-                                            <p:txEl>
-                                              <p:pRg st="6" end="6"/>
-                                            </p:txEl>
-                                          </p:spTgt>
-                                        </p:tgtEl>
-                                        <p:attrNameLst>
-                                          <p:attrName>style.visibility</p:attrName>
-                                        </p:attrNameLst>
-                                      </p:cBhvr>
-                                      <p:to>
-                                        <p:strVal val="visible"/>
-                                      </p:to>
-                                    </p:set>
-                                  </p:childTnLst>
-                                </p:cTn>
-                              </p:par>
-                              <p:par>
-                                <p:cTn id="27" presetID="1" presetClass="entr" presetSubtype="0" fill="hold" grpId="0" nodeType="withEffect">
-                                  <p:stCondLst>
-                                    <p:cond delay="0"/>
-                                  </p:stCondLst>
-                                  <p:childTnLst>
-                                    <p:set>
-                                      <p:cBhvr>
-                                        <p:cTn id="28" dur="1" fill="hold">
-                                          <p:stCondLst>
-                                            <p:cond delay="499"/>
-                                          </p:stCondLst>
-                                        </p:cTn>
-                                        <p:tgtEl>
-                                          <p:spTgt spid="321539">
-                                            <p:txEl>
-                                              <p:pRg st="7" end="7"/>
-                                            </p:txEl>
-                                          </p:spTgt>
-                                        </p:tgtEl>
-                                        <p:attrNameLst>
-                                          <p:attrName>style.visibility</p:attrName>
-                                        </p:attrNameLst>
-                                      </p:cBhvr>
-                                      <p:to>
-                                        <p:strVal val="visible"/>
-                                      </p:to>
-                                    </p:set>
-                                  </p:childTnLst>
-                                </p:cTn>
-                              </p:par>
-                            </p:childTnLst>
-                          </p:cTn>
-                        </p:par>
-                      </p:childTnLst>
-                    </p:cTn>
-                  </p:par>
-                </p:childTnLst>
-              </p:cTn>
-              <p:prevCondLst>
-                <p:cond evt="onPrev" delay="0">
-                  <p:tgtEl>
-                    <p:sldTgt/>
-                  </p:tgtEl>
-                </p:cond>
-              </p:prevCondLst>
-              <p:nextCondLst>
-                <p:cond evt="onNext" delay="0">
-                  <p:tgtEl>
-                    <p:sldTgt/>
-                  </p:tgtEl>
-                </p:cond>
-              </p:nextCondLst>
-            </p:seq>
-          </p:childTnLst>
-        </p:cTn>
-      </p:par>
-    </p:tnLst>
-    <p:bldLst>
-      <p:bldP spid="321539" grpId="0" build="p" autoUpdateAnimBg="0"/>
-    </p:bldLst>
-  </p:timing>
 </p:sld>
 </file>
 
@@ -12029,7 +10522,7 @@
       </p:grpSpPr>
       <p:sp>
         <p:nvSpPr>
-          <p:cNvPr id="202756" name="Rectangle 4"/>
+          <p:cNvPr id="321538" name="Rectangle 2"/>
           <p:cNvSpPr>
             <a:spLocks noGrp="1" noChangeArrowheads="1"/>
           </p:cNvSpPr>
@@ -12044,14 +10537,14 @@
           <a:p>
             <a:r>
               <a:rPr lang="en-US"/>
-              <a:t>Handling S/R &amp; R/R Conflicts</a:t>
-            </a:r>
-          </a:p>
-        </p:txBody>
-      </p:sp>
-      <p:sp>
-        <p:nvSpPr>
-          <p:cNvPr id="202757" name="Rectangle 5"/>
+              <a:t>Parsing - Summary</a:t>
+            </a:r>
+          </a:p>
+        </p:txBody>
+      </p:sp>
+      <p:sp>
+        <p:nvSpPr>
+          <p:cNvPr id="321539" name="Rectangle 3"/>
           <p:cNvSpPr>
             <a:spLocks noGrp="1" noChangeArrowheads="1"/>
           </p:cNvSpPr>
@@ -12064,69 +10557,86 @@
           <a:bodyPr/>
           <a:lstStyle/>
           <a:p>
-            <a:pPr>
-              <a:lnSpc>
-                <a:spcPct val="90000"/>
-              </a:lnSpc>
-            </a:pPr>
-            <a:r>
-              <a:rPr lang="en-US"/>
-              <a:t>Have a conflict?</a:t>
-            </a:r>
-          </a:p>
-          <a:p>
-            <a:pPr lvl="1">
-              <a:lnSpc>
-                <a:spcPct val="90000"/>
-              </a:lnSpc>
-            </a:pPr>
-            <a:r>
-              <a:rPr lang="en-US"/>
-              <a:t>No? – Done, grammar is compliant.</a:t>
-            </a:r>
-          </a:p>
-          <a:p>
-            <a:pPr>
-              <a:lnSpc>
-                <a:spcPct val="90000"/>
-              </a:lnSpc>
-            </a:pPr>
-            <a:r>
-              <a:rPr lang="en-US"/>
-              <a:t>Already using most powerful parser available?</a:t>
-            </a:r>
-          </a:p>
-          <a:p>
-            <a:pPr lvl="1">
-              <a:lnSpc>
-                <a:spcPct val="90000"/>
-              </a:lnSpc>
-            </a:pPr>
-            <a:r>
-              <a:rPr lang="en-US"/>
-              <a:t>No? – Upgrade and goto 1</a:t>
-            </a:r>
-          </a:p>
-          <a:p>
-            <a:pPr>
-              <a:lnSpc>
-                <a:spcPct val="90000"/>
-              </a:lnSpc>
-            </a:pPr>
-            <a:r>
-              <a:rPr lang="en-US"/>
-              <a:t>Can the grammar be rearranged so that the conflict disappears?</a:t>
-            </a:r>
-          </a:p>
-          <a:p>
-            <a:pPr lvl="1">
-              <a:lnSpc>
-                <a:spcPct val="90000"/>
-              </a:lnSpc>
-            </a:pPr>
-            <a:r>
-              <a:rPr lang="en-US"/>
-              <a:t>While preserving the language!</a:t>
+            <a:r>
+              <a:rPr lang="en-US" sz="2800"/>
+              <a:t>Top-down vs. bottom-up</a:t>
+            </a:r>
+          </a:p>
+          <a:p>
+            <a:r>
+              <a:rPr lang="en-US" sz="2800"/>
+              <a:t>Lookahead: FIRST and FOLLOW sets</a:t>
+            </a:r>
+          </a:p>
+          <a:p>
+            <a:r>
+              <a:rPr lang="en-US" sz="2800"/>
+              <a:t>LL(1) – Parsing: </a:t>
+            </a:r>
+            <a:r>
+              <a:rPr lang="en-US" sz="2800" i="1"/>
+              <a:t>O</a:t>
+            </a:r>
+            <a:r>
+              <a:rPr lang="en-US" sz="2800"/>
+              <a:t>(</a:t>
+            </a:r>
+            <a:r>
+              <a:rPr lang="en-US" sz="2800" i="1"/>
+              <a:t>n</a:t>
+            </a:r>
+            <a:r>
+              <a:rPr lang="en-US" sz="2800"/>
+              <a:t>) time complexity</a:t>
+            </a:r>
+          </a:p>
+          <a:p>
+            <a:pPr lvl="1"/>
+            <a:r>
+              <a:rPr lang="en-US" sz="2400"/>
+              <a:t>recursive-descent and table-driven predictive parsing</a:t>
+            </a:r>
+          </a:p>
+          <a:p>
+            <a:r>
+              <a:rPr lang="en-US" sz="2800"/>
+              <a:t>LR(k) – Parsing : </a:t>
+            </a:r>
+            <a:r>
+              <a:rPr lang="en-US" sz="2800" i="1"/>
+              <a:t>O</a:t>
+            </a:r>
+            <a:r>
+              <a:rPr lang="en-US" sz="2800"/>
+              <a:t>(</a:t>
+            </a:r>
+            <a:r>
+              <a:rPr lang="en-US" sz="2800" i="1"/>
+              <a:t>n</a:t>
+            </a:r>
+            <a:r>
+              <a:rPr lang="en-US" sz="2800"/>
+              <a:t>) time complexity</a:t>
+            </a:r>
+          </a:p>
+          <a:p>
+            <a:pPr lvl="1"/>
+            <a:r>
+              <a:rPr lang="en-US" sz="2400"/>
+              <a:t>LR(0), SLR(1), LR(1), LALR(1)</a:t>
+            </a:r>
+          </a:p>
+          <a:p>
+            <a:r>
+              <a:rPr lang="en-US" sz="2800"/>
+              <a:t>Resolving shift/reduce conflicts</a:t>
+            </a:r>
+          </a:p>
+          <a:p>
+            <a:pPr lvl="1"/>
+            <a:r>
+              <a:rPr lang="en-US" sz="2400"/>
+              <a:t>using precedence, associativity</a:t>
             </a:r>
           </a:p>
         </p:txBody>
@@ -12146,7 +10656,7 @@
           <a:bodyPr/>
           <a:lstStyle/>
           <a:p>
-            <a:fld id="{F01605B4-FD9E-A14A-A43F-08C5F3B7DD8E}" type="slidenum">
+            <a:fld id="{1E9954E9-0610-7043-B023-2390B0BF7BBC}" type="slidenum">
               <a:rPr lang="en-US"/>
               <a:pPr/>
               <a:t>9</a:t>
@@ -12194,7 +10704,7 @@
                                           </p:stCondLst>
                                         </p:cTn>
                                         <p:tgtEl>
-                                          <p:spTgt spid="202757">
+                                          <p:spTgt spid="321539">
                                             <p:txEl>
                                               <p:pRg st="0" end="0"/>
                                             </p:txEl>
@@ -12211,21 +10721,39 @@
                                   </p:childTnLst>
                                 </p:cTn>
                               </p:par>
+                            </p:childTnLst>
+                          </p:cTn>
+                        </p:par>
+                      </p:childTnLst>
+                    </p:cTn>
+                  </p:par>
+                  <p:par>
+                    <p:cTn id="7" fill="hold">
+                      <p:stCondLst>
+                        <p:cond delay="indefinite"/>
+                      </p:stCondLst>
+                      <p:childTnLst>
+                        <p:par>
+                          <p:cTn id="8" fill="hold">
+                            <p:stCondLst>
+                              <p:cond delay="0"/>
+                            </p:stCondLst>
+                            <p:childTnLst>
                               <p:par>
-                                <p:cTn id="7" presetID="1" presetClass="entr" presetSubtype="0" fill="hold" grpId="0" nodeType="withEffect">
+                                <p:cTn id="9" presetID="1" presetClass="entr" presetSubtype="0" fill="hold" grpId="0" nodeType="clickEffect">
                                   <p:stCondLst>
                                     <p:cond delay="0"/>
                                   </p:stCondLst>
                                   <p:childTnLst>
                                     <p:set>
                                       <p:cBhvr>
-                                        <p:cTn id="8" dur="1" fill="hold">
+                                        <p:cTn id="10" dur="1" fill="hold">
                                           <p:stCondLst>
                                             <p:cond delay="499"/>
                                           </p:stCondLst>
                                         </p:cTn>
                                         <p:tgtEl>
-                                          <p:spTgt spid="202757">
+                                          <p:spTgt spid="321539">
                                             <p:txEl>
                                               <p:pRg st="1" end="1"/>
                                             </p:txEl>
@@ -12249,32 +10777,32 @@
                     </p:cTn>
                   </p:par>
                   <p:par>
-                    <p:cTn id="9" fill="hold">
+                    <p:cTn id="11" fill="hold">
                       <p:stCondLst>
                         <p:cond delay="indefinite"/>
                       </p:stCondLst>
                       <p:childTnLst>
                         <p:par>
-                          <p:cTn id="10" fill="hold">
+                          <p:cTn id="12" fill="hold">
                             <p:stCondLst>
                               <p:cond delay="0"/>
                             </p:stCondLst>
                             <p:childTnLst>
                               <p:par>
-                                <p:cTn id="11" presetID="1" presetClass="entr" presetSubtype="0" fill="hold" grpId="0" nodeType="clickEffect">
+                                <p:cTn id="13" presetID="1" presetClass="entr" presetSubtype="0" fill="hold" grpId="0" nodeType="clickEffect">
                                   <p:stCondLst>
                                     <p:cond delay="0"/>
                                   </p:stCondLst>
                                   <p:childTnLst>
                                     <p:set>
                                       <p:cBhvr>
-                                        <p:cTn id="12" dur="1" fill="hold">
+                                        <p:cTn id="14" dur="1" fill="hold">
                                           <p:stCondLst>
                                             <p:cond delay="499"/>
                                           </p:stCondLst>
                                         </p:cTn>
                                         <p:tgtEl>
-                                          <p:spTgt spid="202757">
+                                          <p:spTgt spid="321539">
                                             <p:txEl>
                                               <p:pRg st="2" end="2"/>
                                             </p:txEl>
@@ -12292,20 +10820,20 @@
                                 </p:cTn>
                               </p:par>
                               <p:par>
-                                <p:cTn id="13" presetID="1" presetClass="entr" presetSubtype="0" fill="hold" grpId="0" nodeType="withEffect">
+                                <p:cTn id="15" presetID="1" presetClass="entr" presetSubtype="0" fill="hold" grpId="0" nodeType="withEffect">
                                   <p:stCondLst>
                                     <p:cond delay="0"/>
                                   </p:stCondLst>
                                   <p:childTnLst>
                                     <p:set>
                                       <p:cBhvr>
-                                        <p:cTn id="14" dur="1" fill="hold">
+                                        <p:cTn id="16" dur="1" fill="hold">
                                           <p:stCondLst>
                                             <p:cond delay="499"/>
                                           </p:stCondLst>
                                         </p:cTn>
                                         <p:tgtEl>
-                                          <p:spTgt spid="202757">
+                                          <p:spTgt spid="321539">
                                             <p:txEl>
                                               <p:pRg st="3" end="3"/>
                                             </p:txEl>
@@ -12329,32 +10857,32 @@
                     </p:cTn>
                   </p:par>
                   <p:par>
-                    <p:cTn id="15" fill="hold">
+                    <p:cTn id="17" fill="hold">
                       <p:stCondLst>
                         <p:cond delay="indefinite"/>
                       </p:stCondLst>
                       <p:childTnLst>
                         <p:par>
-                          <p:cTn id="16" fill="hold">
+                          <p:cTn id="18" fill="hold">
                             <p:stCondLst>
                               <p:cond delay="0"/>
                             </p:stCondLst>
                             <p:childTnLst>
                               <p:par>
-                                <p:cTn id="17" presetID="1" presetClass="entr" presetSubtype="0" fill="hold" grpId="0" nodeType="clickEffect">
+                                <p:cTn id="19" presetID="1" presetClass="entr" presetSubtype="0" fill="hold" grpId="0" nodeType="clickEffect">
                                   <p:stCondLst>
                                     <p:cond delay="0"/>
                                   </p:stCondLst>
                                   <p:childTnLst>
                                     <p:set>
                                       <p:cBhvr>
-                                        <p:cTn id="18" dur="1" fill="hold">
+                                        <p:cTn id="20" dur="1" fill="hold">
                                           <p:stCondLst>
                                             <p:cond delay="499"/>
                                           </p:stCondLst>
                                         </p:cTn>
                                         <p:tgtEl>
-                                          <p:spTgt spid="202757">
+                                          <p:spTgt spid="321539">
                                             <p:txEl>
                                               <p:pRg st="4" end="4"/>
                                             </p:txEl>
@@ -12372,22 +10900,102 @@
                                 </p:cTn>
                               </p:par>
                               <p:par>
-                                <p:cTn id="19" presetID="1" presetClass="entr" presetSubtype="0" fill="hold" grpId="0" nodeType="withEffect">
+                                <p:cTn id="21" presetID="1" presetClass="entr" presetSubtype="0" fill="hold" grpId="0" nodeType="withEffect">
                                   <p:stCondLst>
                                     <p:cond delay="0"/>
                                   </p:stCondLst>
                                   <p:childTnLst>
                                     <p:set>
                                       <p:cBhvr>
-                                        <p:cTn id="20" dur="1" fill="hold">
+                                        <p:cTn id="22" dur="1" fill="hold">
                                           <p:stCondLst>
                                             <p:cond delay="499"/>
                                           </p:stCondLst>
                                         </p:cTn>
                                         <p:tgtEl>
-                                          <p:spTgt spid="202757">
+                                          <p:spTgt spid="321539">
                                             <p:txEl>
                                               <p:pRg st="5" end="5"/>
+                                            </p:txEl>
+                                          </p:spTgt>
+                                        </p:tgtEl>
+                                        <p:attrNameLst>
+                                          <p:attrName>style.visibility</p:attrName>
+                                        </p:attrNameLst>
+                                      </p:cBhvr>
+                                      <p:to>
+                                        <p:strVal val="visible"/>
+                                      </p:to>
+                                    </p:set>
+                                  </p:childTnLst>
+                                </p:cTn>
+                              </p:par>
+                            </p:childTnLst>
+                          </p:cTn>
+                        </p:par>
+                      </p:childTnLst>
+                    </p:cTn>
+                  </p:par>
+                  <p:par>
+                    <p:cTn id="23" fill="hold">
+                      <p:stCondLst>
+                        <p:cond delay="indefinite"/>
+                      </p:stCondLst>
+                      <p:childTnLst>
+                        <p:par>
+                          <p:cTn id="24" fill="hold">
+                            <p:stCondLst>
+                              <p:cond delay="0"/>
+                            </p:stCondLst>
+                            <p:childTnLst>
+                              <p:par>
+                                <p:cTn id="25" presetID="1" presetClass="entr" presetSubtype="0" fill="hold" grpId="0" nodeType="clickEffect">
+                                  <p:stCondLst>
+                                    <p:cond delay="0"/>
+                                  </p:stCondLst>
+                                  <p:childTnLst>
+                                    <p:set>
+                                      <p:cBhvr>
+                                        <p:cTn id="26" dur="1" fill="hold">
+                                          <p:stCondLst>
+                                            <p:cond delay="499"/>
+                                          </p:stCondLst>
+                                        </p:cTn>
+                                        <p:tgtEl>
+                                          <p:spTgt spid="321539">
+                                            <p:txEl>
+                                              <p:pRg st="6" end="6"/>
+                                            </p:txEl>
+                                          </p:spTgt>
+                                        </p:tgtEl>
+                                        <p:attrNameLst>
+                                          <p:attrName>style.visibility</p:attrName>
+                                        </p:attrNameLst>
+                                      </p:cBhvr>
+                                      <p:to>
+                                        <p:strVal val="visible"/>
+                                      </p:to>
+                                    </p:set>
+                                  </p:childTnLst>
+                                </p:cTn>
+                              </p:par>
+                              <p:par>
+                                <p:cTn id="27" presetID="1" presetClass="entr" presetSubtype="0" fill="hold" grpId="0" nodeType="withEffect">
+                                  <p:stCondLst>
+                                    <p:cond delay="0"/>
+                                  </p:stCondLst>
+                                  <p:childTnLst>
+                                    <p:set>
+                                      <p:cBhvr>
+                                        <p:cTn id="28" dur="1" fill="hold">
+                                          <p:stCondLst>
+                                            <p:cond delay="499"/>
+                                          </p:stCondLst>
+                                        </p:cTn>
+                                        <p:tgtEl>
+                                          <p:spTgt spid="321539">
+                                            <p:txEl>
+                                              <p:pRg st="7" end="7"/>
                                             </p:txEl>
                                           </p:spTgt>
                                         </p:tgtEl>
@@ -12430,7 +11038,7 @@
       </p:par>
     </p:tnLst>
     <p:bldLst>
-      <p:bldP spid="202757" grpId="0" build="p" autoUpdateAnimBg="0"/>
+      <p:bldP spid="321539" grpId="0" build="p" autoUpdateAnimBg="0"/>
     </p:bldLst>
   </p:timing>
 </p:sld>

</xml_diff>